<commit_message>
TOM 08 angepasst und pdf gelöscht
</commit_message>
<xml_diff>
--- a/music moves/Tomatoes (TOM)/ger/apprentice/ger_TOM_10_Alles_Tomate_MM_A.pptx
+++ b/music moves/Tomatoes (TOM)/ger/apprentice/ger_TOM_10_Alles_Tomate_MM_A.pptx
@@ -716,7 +716,7 @@
           <a:p>
             <a:fld id="{FF5B2BAF-DF38-0A48-A798-0C06E514FD52}" type="datetimeFigureOut">
               <a:rPr lang="de-DE" smtClean="0"/>
-              <a:t>15.07.15</a:t>
+              <a:t>12.08.15</a:t>
             </a:fld>
             <a:endParaRPr lang="de-DE" dirty="0"/>
           </a:p>
@@ -931,7 +931,7 @@
           <a:p>
             <a:fld id="{FF5B2BAF-DF38-0A48-A798-0C06E514FD52}" type="datetimeFigureOut">
               <a:rPr lang="de-DE" smtClean="0"/>
-              <a:t>15.07.15</a:t>
+              <a:t>12.08.15</a:t>
             </a:fld>
             <a:endParaRPr lang="de-DE" dirty="0"/>
           </a:p>
@@ -1623,15 +1623,24 @@
               </a:spcBef>
             </a:pPr>
             <a:r>
+              <a:rPr lang="de-DE" sz="1050" dirty="0" smtClean="0"/>
+              <a:t>Wie viele Tomaten</a:t>
+            </a:r>
+            <a:r>
+              <a:rPr lang="de-DE" sz="1050" dirty="0" smtClean="0"/>
+              <a:t> </a:t>
+            </a:r>
+            <a:r>
               <a:rPr lang="de-DE" sz="1050" dirty="0"/>
-              <a:t>Was schaffe ich an einem Tag? Mit welchem Tagespensum fühle ich mich überfordert? </a:t>
-            </a:r>
-            <a:br>
+              <a:t>schaffe ich an einem Tag? Mit welchem Tagespensum fühle ich mich überfordert? </a:t>
+            </a:r>
+            <a:r>
+              <a:rPr lang="de-DE" sz="1050" dirty="0" smtClean="0"/>
+              <a:t>Wann </a:t>
+            </a:r>
+            <a:r>
               <a:rPr lang="de-DE" sz="1050" dirty="0"/>
-            </a:br>
-            <a:r>
-              <a:rPr lang="de-DE" sz="1050" dirty="0"/>
-              <a:t>Wann wird es langweilig?</a:t>
+              <a:t>wird es langweilig?</a:t>
             </a:r>
           </a:p>
           <a:p>
@@ -1686,7 +1695,39 @@
             </a:pPr>
             <a:r>
               <a:rPr lang="de-DE" sz="1050" dirty="0"/>
-              <a:t>Wenn du Anfänger bist, kannst Du mit vier Tomaten pro Tag beginnen und Dich später auf bis zu acht Tomaten zu je 25 Minuten steigern</a:t>
+              <a:t>Wenn du Anfänger bist, kannst Du mit </a:t>
+            </a:r>
+            <a:r>
+              <a:rPr lang="de-DE" sz="1050" dirty="0"/>
+              <a:t>2</a:t>
+            </a:r>
+            <a:r>
+              <a:rPr lang="de-DE" sz="1050" dirty="0" smtClean="0"/>
+              <a:t> </a:t>
+            </a:r>
+            <a:r>
+              <a:rPr lang="de-DE" sz="1050" dirty="0"/>
+              <a:t>Tomaten pro Tag beginnen und Dich später auf bis zu </a:t>
+            </a:r>
+            <a:r>
+              <a:rPr lang="de-DE" sz="1050" dirty="0"/>
+              <a:t>8</a:t>
+            </a:r>
+            <a:r>
+              <a:rPr lang="de-DE" sz="1050" dirty="0" smtClean="0"/>
+              <a:t> oder </a:t>
+            </a:r>
+            <a:r>
+              <a:rPr lang="de-DE" sz="1050" dirty="0" smtClean="0"/>
+              <a:t>10</a:t>
+            </a:r>
+            <a:r>
+              <a:rPr lang="de-DE" sz="1050" dirty="0" smtClean="0"/>
+              <a:t> </a:t>
+            </a:r>
+            <a:r>
+              <a:rPr lang="de-DE" sz="1050" dirty="0"/>
+              <a:t>Tomaten zu je 25 Minuten steigern</a:t>
             </a:r>
             <a:r>
               <a:rPr lang="de-DE" sz="1050" dirty="0" smtClean="0"/>
@@ -1765,7 +1806,19 @@
             </a:pPr>
             <a:r>
               <a:rPr lang="de-DE" sz="1050" dirty="0"/>
-              <a:t>Das Ziel ist am Ende genau das zu erreichen, was man sich vorgenommen hat. Nicht mehr. Vermeide liegen gebliebene Dinge vom Vortag wieder reinzuarbeiten. Jeder Tag ist einzigartig und nicht das Anhängsel von gestern.</a:t>
+              <a:t>Das Ziel ist am Ende genau das zu erreichen, was </a:t>
+            </a:r>
+            <a:r>
+              <a:rPr lang="de-DE" sz="1050" dirty="0" smtClean="0"/>
+              <a:t>Du Dir</a:t>
+            </a:r>
+            <a:r>
+              <a:rPr lang="de-DE" sz="1050" dirty="0" smtClean="0"/>
+              <a:t> </a:t>
+            </a:r>
+            <a:r>
+              <a:rPr lang="de-DE" sz="1050" dirty="0"/>
+              <a:t>vorgenommen hat. Nicht mehr. Vermeide liegen gebliebene Dinge vom Vortag wieder reinzuarbeiten. Jeder Tag ist einzigartig und nicht das Anhängsel von gestern.</a:t>
             </a:r>
           </a:p>
           <a:p>
@@ -1781,13 +1834,7 @@
               <a:rPr lang="de-DE" sz="1050" dirty="0"/>
               <a:t>Teile Dir Deine Arbeit in Tomaten ein und gib jeder Tomate einen Titel. </a:t>
             </a:r>
-            <a:br>
-              <a:rPr lang="de-DE" sz="1050" dirty="0"/>
-            </a:br>
-            <a:r>
-              <a:rPr lang="de-DE" sz="1050" dirty="0"/>
-              <a:t>Lass Deinen Tagesplan von Deinem Team bewerten und bewerte den Tagesplan Deiner Kollegen. </a:t>
-            </a:r>
+            <a:endParaRPr lang="de-DE" sz="1050" dirty="0" smtClean="0"/>
           </a:p>
           <a:p>
             <a:pPr>
@@ -1799,23 +1846,56 @@
               </a:spcBef>
             </a:pPr>
             <a:r>
+              <a:rPr lang="de-DE" sz="1050" dirty="0" smtClean="0"/>
+              <a:t>Schreibe </a:t>
+            </a:r>
+            <a:r>
               <a:rPr lang="de-DE" sz="1050" dirty="0"/>
-              <a:t>Schreibe in zwei Wochen acht Tagespläne und bewerte acht Tagespläne </a:t>
-            </a:r>
-            <a:br>
+              <a:t>in </a:t>
+            </a:r>
+            <a:r>
               <a:rPr lang="de-DE" sz="1050" dirty="0"/>
-            </a:br>
+              <a:t>2</a:t>
+            </a:r>
             <a:r>
               <a:rPr lang="de-DE" sz="1050" dirty="0" smtClean="0"/>
-              <a:t>Deiner </a:t>
+              <a:t> </a:t>
             </a:r>
             <a:r>
               <a:rPr lang="de-DE" sz="1050" dirty="0"/>
-              <a:t>Kollegen mit eins bis fünf Sternen.</a:t>
+              <a:t>Wochen </a:t>
+            </a:r>
+            <a:r>
+              <a:rPr lang="de-DE" sz="1050" dirty="0"/>
+              <a:t>8</a:t>
+            </a:r>
+            <a:r>
+              <a:rPr lang="de-DE" sz="1050" dirty="0" smtClean="0"/>
+              <a:t> Tagespläne.</a:t>
+            </a:r>
+          </a:p>
+          <a:p>
+            <a:pPr>
+              <a:lnSpc>
+                <a:spcPct val="100000"/>
+              </a:lnSpc>
+              <a:spcBef>
+                <a:spcPts val="1000"/>
+              </a:spcBef>
+            </a:pPr>
+            <a:r>
+              <a:rPr lang="de-DE"/>
+              <a:t>Zeig Deinem Team Deine Tagespläne.</a:t>
             </a:r>
           </a:p>
           <a:p>
             <a:pPr marL="0" indent="0">
+              <a:lnSpc>
+                <a:spcPct val="100000"/>
+              </a:lnSpc>
+              <a:spcBef>
+                <a:spcPts val="1000"/>
+              </a:spcBef>
               <a:buNone/>
             </a:pPr>
             <a:endParaRPr lang="de-DE" dirty="0"/>

</xml_diff>